<commit_message>
fix answers to tasks5 problem 13 onwards (#2)
* submission instructions; fix task 16

* clarify task 13

* fix task 13 etc. examples
</commit_message>
<xml_diff>
--- a/tasks2.pptx
+++ b/tasks2.pptx
@@ -275,7 +275,7 @@
           <a:p>
             <a:fld id="{4C324CBA-B5F8-49E4-A74D-FDDDFCEF0F4B}" type="datetimeFigureOut">
               <a:rPr lang="en-GB" smtClean="0"/>
-              <a:t>19/08/2021</a:t>
+              <a:t>28/08/2021</a:t>
             </a:fld>
             <a:endParaRPr lang="en-GB"/>
           </a:p>
@@ -475,7 +475,7 @@
           <a:p>
             <a:fld id="{4C324CBA-B5F8-49E4-A74D-FDDDFCEF0F4B}" type="datetimeFigureOut">
               <a:rPr lang="en-GB" smtClean="0"/>
-              <a:t>19/08/2021</a:t>
+              <a:t>28/08/2021</a:t>
             </a:fld>
             <a:endParaRPr lang="en-GB"/>
           </a:p>
@@ -685,7 +685,7 @@
           <a:p>
             <a:fld id="{4C324CBA-B5F8-49E4-A74D-FDDDFCEF0F4B}" type="datetimeFigureOut">
               <a:rPr lang="en-GB" smtClean="0"/>
-              <a:t>19/08/2021</a:t>
+              <a:t>28/08/2021</a:t>
             </a:fld>
             <a:endParaRPr lang="en-GB"/>
           </a:p>
@@ -885,7 +885,7 @@
           <a:p>
             <a:fld id="{4C324CBA-B5F8-49E4-A74D-FDDDFCEF0F4B}" type="datetimeFigureOut">
               <a:rPr lang="en-GB" smtClean="0"/>
-              <a:t>19/08/2021</a:t>
+              <a:t>28/08/2021</a:t>
             </a:fld>
             <a:endParaRPr lang="en-GB"/>
           </a:p>
@@ -1161,7 +1161,7 @@
           <a:p>
             <a:fld id="{4C324CBA-B5F8-49E4-A74D-FDDDFCEF0F4B}" type="datetimeFigureOut">
               <a:rPr lang="en-GB" smtClean="0"/>
-              <a:t>19/08/2021</a:t>
+              <a:t>28/08/2021</a:t>
             </a:fld>
             <a:endParaRPr lang="en-GB"/>
           </a:p>
@@ -1429,7 +1429,7 @@
           <a:p>
             <a:fld id="{4C324CBA-B5F8-49E4-A74D-FDDDFCEF0F4B}" type="datetimeFigureOut">
               <a:rPr lang="en-GB" smtClean="0"/>
-              <a:t>19/08/2021</a:t>
+              <a:t>28/08/2021</a:t>
             </a:fld>
             <a:endParaRPr lang="en-GB"/>
           </a:p>
@@ -1844,7 +1844,7 @@
           <a:p>
             <a:fld id="{4C324CBA-B5F8-49E4-A74D-FDDDFCEF0F4B}" type="datetimeFigureOut">
               <a:rPr lang="en-GB" smtClean="0"/>
-              <a:t>19/08/2021</a:t>
+              <a:t>28/08/2021</a:t>
             </a:fld>
             <a:endParaRPr lang="en-GB"/>
           </a:p>
@@ -1986,7 +1986,7 @@
           <a:p>
             <a:fld id="{4C324CBA-B5F8-49E4-A74D-FDDDFCEF0F4B}" type="datetimeFigureOut">
               <a:rPr lang="en-GB" smtClean="0"/>
-              <a:t>19/08/2021</a:t>
+              <a:t>28/08/2021</a:t>
             </a:fld>
             <a:endParaRPr lang="en-GB"/>
           </a:p>
@@ -2099,7 +2099,7 @@
           <a:p>
             <a:fld id="{4C324CBA-B5F8-49E4-A74D-FDDDFCEF0F4B}" type="datetimeFigureOut">
               <a:rPr lang="en-GB" smtClean="0"/>
-              <a:t>19/08/2021</a:t>
+              <a:t>28/08/2021</a:t>
             </a:fld>
             <a:endParaRPr lang="en-GB"/>
           </a:p>
@@ -2412,7 +2412,7 @@
           <a:p>
             <a:fld id="{4C324CBA-B5F8-49E4-A74D-FDDDFCEF0F4B}" type="datetimeFigureOut">
               <a:rPr lang="en-GB" smtClean="0"/>
-              <a:t>19/08/2021</a:t>
+              <a:t>28/08/2021</a:t>
             </a:fld>
             <a:endParaRPr lang="en-GB"/>
           </a:p>
@@ -2701,7 +2701,7 @@
           <a:p>
             <a:fld id="{4C324CBA-B5F8-49E4-A74D-FDDDFCEF0F4B}" type="datetimeFigureOut">
               <a:rPr lang="en-GB" smtClean="0"/>
-              <a:t>19/08/2021</a:t>
+              <a:t>28/08/2021</a:t>
             </a:fld>
             <a:endParaRPr lang="en-GB"/>
           </a:p>
@@ -2946,7 +2946,7 @@
             <a:fld id="{4C324CBA-B5F8-49E4-A74D-FDDDFCEF0F4B}" type="datetimeFigureOut">
               <a:rPr lang="en-GB" smtClean="0"/>
               <a:pPr/>
-              <a:t>19/08/2021</a:t>
+              <a:t>28/08/2021</a:t>
             </a:fld>
             <a:endParaRPr lang="en-GB" dirty="0"/>
           </a:p>
@@ -4093,7 +4093,7 @@
         <p:spPr>
           <a:xfrm>
             <a:off x="696000" y="729000"/>
-            <a:ext cx="10800000" cy="5078313"/>
+            <a:ext cx="10800000" cy="4201150"/>
           </a:xfrm>
           <a:prstGeom prst="rect">
             <a:avLst/>
@@ -4130,41 +4130,41 @@
               <a:buNone/>
             </a:pPr>
             <a:r>
-              <a:rPr lang="en-GB" sz="3600" dirty="0">
+              <a:rPr lang="en-GB" sz="3300" dirty="0">
                 <a:latin typeface="Atkinson Hyperlegible" pitchFamily="50" charset="0"/>
               </a:rPr>
               <a:t>Using </a:t>
             </a:r>
             <a:r>
-              <a:rPr lang="en-GB" sz="3600" dirty="0">
+              <a:rPr lang="en-GB" sz="3300" dirty="0">
                 <a:latin typeface="APL385 Unicode" panose="020B0709000202000203" pitchFamily="49" charset="0"/>
               </a:rPr>
               <a:t>incomes</a:t>
             </a:r>
             <a:r>
-              <a:rPr lang="en-GB" sz="3600" dirty="0">
-                <a:latin typeface="Atkinson Hyperlegible" pitchFamily="50" charset="0"/>
-              </a:rPr>
-              <a:t>, compute the total income for each product on each day:</a:t>
-            </a:r>
-          </a:p>
-          <a:p>
-            <a:pPr marL="0" indent="0">
-              <a:buNone/>
-            </a:pPr>
-            <a:r>
-              <a:rPr lang="en-GB" sz="3600" dirty="0">
+              <a:rPr lang="en-GB" sz="3300" dirty="0">
+                <a:latin typeface="Atkinson Hyperlegible" pitchFamily="50" charset="0"/>
+              </a:rPr>
+              <a:t>, compute the total income for each day:</a:t>
+            </a:r>
+          </a:p>
+          <a:p>
+            <a:pPr marL="0" indent="0">
+              <a:buNone/>
+            </a:pPr>
+            <a:r>
+              <a:rPr lang="en-GB" sz="3300" dirty="0">
                 <a:latin typeface="APL385 Unicode" panose="020B0709000202000203" pitchFamily="49" charset="0"/>
               </a:rPr>
               <a:t>      </a:t>
             </a:r>
             <a:r>
-              <a:rPr lang="en-GB" sz="3600" dirty="0" err="1">
+              <a:rPr lang="en-GB" sz="3300" dirty="0" err="1">
                 <a:latin typeface="APL385 Unicode" panose="020B0709000202000203" pitchFamily="49" charset="0"/>
               </a:rPr>
               <a:t>total_per_day</a:t>
             </a:r>
-            <a:endParaRPr lang="en-GB" sz="3600" dirty="0">
+            <a:endParaRPr lang="en-GB" sz="3300" dirty="0">
               <a:latin typeface="APL385 Unicode" panose="020B0709000202000203" pitchFamily="49" charset="0"/>
             </a:endParaRPr>
           </a:p>
@@ -4173,32 +4173,32 @@
               <a:buNone/>
             </a:pPr>
             <a:r>
-              <a:rPr lang="en-GB" sz="3600" dirty="0">
+              <a:rPr lang="en-GB" sz="3300" dirty="0">
                 <a:latin typeface="APL385 Unicode" panose="020B0709000202000203" pitchFamily="49" charset="0"/>
               </a:rPr>
               <a:t>50.45 69.72 68.68 47.25 50.45</a:t>
             </a:r>
           </a:p>
           <a:p>
-            <a:endParaRPr lang="en-GB" sz="3600" dirty="0">
+            <a:endParaRPr lang="en-GB" sz="3300" dirty="0">
               <a:latin typeface="Atkinson Hyperlegible" pitchFamily="50" charset="0"/>
             </a:endParaRPr>
           </a:p>
           <a:p>
             <a:r>
-              <a:rPr lang="en-GB" sz="3600" dirty="0">
+              <a:rPr lang="en-GB" sz="3300" dirty="0">
                 <a:latin typeface="Atkinson Hyperlegible" pitchFamily="50" charset="0"/>
               </a:rPr>
               <a:t>Using </a:t>
             </a:r>
             <a:r>
-              <a:rPr lang="en-GB" sz="3600" dirty="0" err="1">
+              <a:rPr lang="en-GB" sz="3300" dirty="0" err="1">
                 <a:latin typeface="APL385 Unicode" panose="020B0709000202000203" pitchFamily="49" charset="0"/>
               </a:rPr>
               <a:t>total_per_day</a:t>
             </a:r>
             <a:r>
-              <a:rPr lang="en-GB" sz="3600" dirty="0">
+              <a:rPr lang="en-GB" sz="3300" dirty="0">
                 <a:latin typeface="Atkinson Hyperlegible" pitchFamily="50" charset="0"/>
               </a:rPr>
               <a:t>, compute the grand total:</a:t>
@@ -4209,18 +4209,18 @@
               <a:buNone/>
             </a:pPr>
             <a:r>
-              <a:rPr lang="en-GB" sz="3600" dirty="0">
+              <a:rPr lang="en-GB" sz="3300" dirty="0">
                 <a:latin typeface="APL385 Unicode" panose="020B0709000202000203" pitchFamily="49" charset="0"/>
               </a:rPr>
               <a:t>      </a:t>
             </a:r>
             <a:r>
-              <a:rPr lang="en-GB" sz="3600" dirty="0" err="1">
+              <a:rPr lang="en-GB" sz="3300" dirty="0" err="1">
                 <a:latin typeface="APL385 Unicode" panose="020B0709000202000203" pitchFamily="49" charset="0"/>
               </a:rPr>
               <a:t>grand_total</a:t>
             </a:r>
-            <a:endParaRPr lang="en-GB" sz="3600" dirty="0">
+            <a:endParaRPr lang="en-GB" sz="3300" dirty="0">
               <a:latin typeface="APL385 Unicode" panose="020B0709000202000203" pitchFamily="49" charset="0"/>
             </a:endParaRPr>
           </a:p>
@@ -4229,7 +4229,7 @@
               <a:buNone/>
             </a:pPr>
             <a:r>
-              <a:rPr lang="en-GB" sz="3600" dirty="0">
+              <a:rPr lang="en-GB" sz="3300" dirty="0">
                 <a:latin typeface="APL385 Unicode" panose="020B0709000202000203" pitchFamily="49" charset="0"/>
               </a:rPr>
               <a:t>286.55</a:t>
@@ -6043,8 +6043,8 @@
           <a:chExt cx="0" cy="0"/>
         </a:xfrm>
       </p:grpSpPr>
-      <mc:AlternateContent xmlns:mc="http://schemas.openxmlformats.org/markup-compatibility/2006">
-        <mc:Choice xmlns:a14="http://schemas.microsoft.com/office/drawing/2010/main" Requires="a14">
+      <mc:AlternateContent xmlns:mc="http://schemas.openxmlformats.org/markup-compatibility/2006" xmlns:a14="http://schemas.microsoft.com/office/drawing/2010/main">
+        <mc:Choice Requires="a14">
           <p:sp>
             <p:nvSpPr>
               <p:cNvPr id="2" name="TextBox 1">
@@ -6356,7 +6356,7 @@
             </p:txBody>
           </p:sp>
         </mc:Choice>
-        <mc:Fallback>
+        <mc:Fallback xmlns="">
           <p:sp>
             <p:nvSpPr>
               <p:cNvPr id="2" name="TextBox 1">

</xml_diff>

<commit_message>
Revision notes and revised task descriptions and examples
</commit_message>
<xml_diff>
--- a/tasks2.pptx
+++ b/tasks2.pptx
@@ -275,7 +275,7 @@
           <a:p>
             <a:fld id="{4C324CBA-B5F8-49E4-A74D-FDDDFCEF0F4B}" type="datetimeFigureOut">
               <a:rPr lang="en-GB" smtClean="0"/>
-              <a:t>28/08/2021</a:t>
+              <a:t>02/09/2021</a:t>
             </a:fld>
             <a:endParaRPr lang="en-GB"/>
           </a:p>
@@ -475,7 +475,7 @@
           <a:p>
             <a:fld id="{4C324CBA-B5F8-49E4-A74D-FDDDFCEF0F4B}" type="datetimeFigureOut">
               <a:rPr lang="en-GB" smtClean="0"/>
-              <a:t>28/08/2021</a:t>
+              <a:t>02/09/2021</a:t>
             </a:fld>
             <a:endParaRPr lang="en-GB"/>
           </a:p>
@@ -685,7 +685,7 @@
           <a:p>
             <a:fld id="{4C324CBA-B5F8-49E4-A74D-FDDDFCEF0F4B}" type="datetimeFigureOut">
               <a:rPr lang="en-GB" smtClean="0"/>
-              <a:t>28/08/2021</a:t>
+              <a:t>02/09/2021</a:t>
             </a:fld>
             <a:endParaRPr lang="en-GB"/>
           </a:p>
@@ -885,7 +885,7 @@
           <a:p>
             <a:fld id="{4C324CBA-B5F8-49E4-A74D-FDDDFCEF0F4B}" type="datetimeFigureOut">
               <a:rPr lang="en-GB" smtClean="0"/>
-              <a:t>28/08/2021</a:t>
+              <a:t>02/09/2021</a:t>
             </a:fld>
             <a:endParaRPr lang="en-GB"/>
           </a:p>
@@ -1161,7 +1161,7 @@
           <a:p>
             <a:fld id="{4C324CBA-B5F8-49E4-A74D-FDDDFCEF0F4B}" type="datetimeFigureOut">
               <a:rPr lang="en-GB" smtClean="0"/>
-              <a:t>28/08/2021</a:t>
+              <a:t>02/09/2021</a:t>
             </a:fld>
             <a:endParaRPr lang="en-GB"/>
           </a:p>
@@ -1429,7 +1429,7 @@
           <a:p>
             <a:fld id="{4C324CBA-B5F8-49E4-A74D-FDDDFCEF0F4B}" type="datetimeFigureOut">
               <a:rPr lang="en-GB" smtClean="0"/>
-              <a:t>28/08/2021</a:t>
+              <a:t>02/09/2021</a:t>
             </a:fld>
             <a:endParaRPr lang="en-GB"/>
           </a:p>
@@ -1844,7 +1844,7 @@
           <a:p>
             <a:fld id="{4C324CBA-B5F8-49E4-A74D-FDDDFCEF0F4B}" type="datetimeFigureOut">
               <a:rPr lang="en-GB" smtClean="0"/>
-              <a:t>28/08/2021</a:t>
+              <a:t>02/09/2021</a:t>
             </a:fld>
             <a:endParaRPr lang="en-GB"/>
           </a:p>
@@ -1986,7 +1986,7 @@
           <a:p>
             <a:fld id="{4C324CBA-B5F8-49E4-A74D-FDDDFCEF0F4B}" type="datetimeFigureOut">
               <a:rPr lang="en-GB" smtClean="0"/>
-              <a:t>28/08/2021</a:t>
+              <a:t>02/09/2021</a:t>
             </a:fld>
             <a:endParaRPr lang="en-GB"/>
           </a:p>
@@ -2099,7 +2099,7 @@
           <a:p>
             <a:fld id="{4C324CBA-B5F8-49E4-A74D-FDDDFCEF0F4B}" type="datetimeFigureOut">
               <a:rPr lang="en-GB" smtClean="0"/>
-              <a:t>28/08/2021</a:t>
+              <a:t>02/09/2021</a:t>
             </a:fld>
             <a:endParaRPr lang="en-GB"/>
           </a:p>
@@ -2412,7 +2412,7 @@
           <a:p>
             <a:fld id="{4C324CBA-B5F8-49E4-A74D-FDDDFCEF0F4B}" type="datetimeFigureOut">
               <a:rPr lang="en-GB" smtClean="0"/>
-              <a:t>28/08/2021</a:t>
+              <a:t>02/09/2021</a:t>
             </a:fld>
             <a:endParaRPr lang="en-GB"/>
           </a:p>
@@ -2701,7 +2701,7 @@
           <a:p>
             <a:fld id="{4C324CBA-B5F8-49E4-A74D-FDDDFCEF0F4B}" type="datetimeFigureOut">
               <a:rPr lang="en-GB" smtClean="0"/>
-              <a:t>28/08/2021</a:t>
+              <a:t>02/09/2021</a:t>
             </a:fld>
             <a:endParaRPr lang="en-GB"/>
           </a:p>
@@ -2946,7 +2946,7 @@
             <a:fld id="{4C324CBA-B5F8-49E4-A74D-FDDDFCEF0F4B}" type="datetimeFigureOut">
               <a:rPr lang="en-GB" smtClean="0"/>
               <a:pPr/>
-              <a:t>28/08/2021</a:t>
+              <a:t>02/09/2021</a:t>
             </a:fld>
             <a:endParaRPr lang="en-GB" dirty="0"/>
           </a:p>
@@ -3633,7 +3633,7 @@
               <a:rPr lang="en-GB" sz="3600" dirty="0">
                 <a:latin typeface="APL385 Unicode" panose="020B0709000202000203" pitchFamily="49" charset="0"/>
               </a:rPr>
-              <a:t>18 20 15</a:t>
+              <a:t>14 12 11</a:t>
             </a:r>
           </a:p>
           <a:p>
@@ -3695,7 +3695,7 @@
               <a:rPr lang="en-GB" sz="3600" dirty="0">
                 <a:latin typeface="APL385 Unicode" panose="020B0709000202000203" pitchFamily="49" charset="0"/>
               </a:rPr>
-              <a:t>20</a:t>
+              <a:t>14</a:t>
             </a:r>
             <a:endParaRPr lang="en-GB" sz="3600" dirty="0">
               <a:latin typeface="Atkinson Hyperlegible" pitchFamily="50" charset="0"/>
@@ -3748,7 +3748,7 @@
         <p:spPr>
           <a:xfrm>
             <a:off x="696000" y="870687"/>
-            <a:ext cx="10800000" cy="5078313"/>
+            <a:ext cx="10800000" cy="4524315"/>
           </a:xfrm>
           <a:prstGeom prst="rect">
             <a:avLst/>
@@ -3788,7 +3788,7 @@
               <a:rPr lang="en-GB" sz="3600" dirty="0">
                 <a:latin typeface="Atkinson Hyperlegible" pitchFamily="50" charset="0"/>
               </a:rPr>
-              <a:t>For each day, how many products did sold at least 1?</a:t>
+              <a:t>For each day, how many products sold at least 1?</a:t>
             </a:r>
           </a:p>
           <a:p>
@@ -3829,7 +3829,7 @@
               <a:rPr lang="en-GB" sz="3600" dirty="0">
                 <a:latin typeface="Atkinson Hyperlegible" pitchFamily="50" charset="0"/>
               </a:rPr>
-              <a:t>On how many days did we sell more than 10 items in total?</a:t>
+              <a:t>On which days were 10 or more items sold?</a:t>
             </a:r>
           </a:p>
           <a:p>
@@ -3860,11 +3860,8 @@
               <a:rPr lang="en-GB" sz="3600" dirty="0">
                 <a:latin typeface="APL385 Unicode" panose="020B0709000202000203" pitchFamily="49" charset="0"/>
               </a:rPr>
-              <a:t>2</a:t>
-            </a:r>
-            <a:endParaRPr lang="en-GB" sz="3600" dirty="0">
-              <a:latin typeface="Atkinson Hyperlegible" pitchFamily="50" charset="0"/>
-            </a:endParaRPr>
+              <a:t>0 1 1 0 0</a:t>
+            </a:r>
           </a:p>
         </p:txBody>
       </p:sp>
@@ -3999,7 +3996,7 @@
               <a:rPr lang="en-GB" sz="3600" dirty="0">
                 <a:latin typeface="APL385 Unicode" panose="020B0709000202000203" pitchFamily="49" charset="0"/>
               </a:rPr>
-              <a:t>10.5 39.95  0   </a:t>
+              <a:t>10.5  7.99  0   </a:t>
             </a:r>
           </a:p>
           <a:p>
@@ -4010,7 +4007,7 @@
               <a:rPr lang="en-GB" sz="3600" dirty="0">
                 <a:latin typeface="APL385 Unicode" panose="020B0709000202000203" pitchFamily="49" charset="0"/>
               </a:rPr>
-              <a:t>24.5 23.97 21.25</a:t>
+              <a:t>24.5 23.97  4.25</a:t>
             </a:r>
           </a:p>
           <a:p>
@@ -4032,7 +4029,7 @@
               <a:rPr lang="en-GB" sz="3600" dirty="0">
                 <a:latin typeface="APL385 Unicode" panose="020B0709000202000203" pitchFamily="49" charset="0"/>
               </a:rPr>
-              <a:t>17.5  0    29.75</a:t>
+              <a:t> 3.5  0    29.75</a:t>
             </a:r>
           </a:p>
           <a:p>
@@ -4043,7 +4040,7 @@
               <a:rPr lang="en-GB" sz="3600" dirty="0">
                 <a:latin typeface="APL385 Unicode" panose="020B0709000202000203" pitchFamily="49" charset="0"/>
               </a:rPr>
-              <a:t>10.5 39.95  0   </a:t>
+              <a:t>10.5  7.99  0 </a:t>
             </a:r>
           </a:p>
         </p:txBody>
@@ -6584,7 +6581,7 @@
               <a:rPr lang="en-GB" sz="3600" dirty="0">
                 <a:latin typeface="APL385 Unicode" panose="020B0709000202000203" pitchFamily="49" charset="0"/>
               </a:rPr>
-              <a:t>      quantities ← 5 3⍴3 5 0 7</a:t>
+              <a:t>      quantities ← 5 3⍴3 1 0 7</a:t>
             </a:r>
             <a:endParaRPr lang="en-GB" sz="3600" dirty="0">
               <a:latin typeface="Atkinson Hyperlegible" pitchFamily="50" charset="0"/>
@@ -6720,7 +6717,7 @@
               <a:rPr lang="en-GB" sz="3600" dirty="0">
                 <a:latin typeface="APL385 Unicode" panose="020B0709000202000203" pitchFamily="49" charset="0"/>
               </a:rPr>
-              <a:t>8 15 10 12 8</a:t>
+              <a:t>4 11 10 8 4</a:t>
             </a:r>
           </a:p>
           <a:p>
@@ -6782,7 +6779,7 @@
               <a:rPr lang="en-GB" sz="3600" dirty="0">
                 <a:latin typeface="APL385 Unicode" panose="020B0709000202000203" pitchFamily="49" charset="0"/>
               </a:rPr>
-              <a:t>53</a:t>
+              <a:t>37</a:t>
             </a:r>
             <a:endParaRPr lang="en-GB" sz="3600" dirty="0">
               <a:latin typeface="Atkinson Hyperlegible" pitchFamily="50" charset="0"/>

</xml_diff>

<commit_message>
Review and revision links (#8)
* submission instructions; fix task 16

* clarify task 13

* fix task 13 etc. examples

* Day 9 summary notes

* add word "reverses" to task 3; add more examples

* tasks 8

* Day11 summary notes and useful links

* Revision notes and revised task descriptions and examples

* Mastering Dyalog links
</commit_message>
<xml_diff>
--- a/tasks2.pptx
+++ b/tasks2.pptx
@@ -275,7 +275,7 @@
           <a:p>
             <a:fld id="{4C324CBA-B5F8-49E4-A74D-FDDDFCEF0F4B}" type="datetimeFigureOut">
               <a:rPr lang="en-GB" smtClean="0"/>
-              <a:t>28/08/2021</a:t>
+              <a:t>02/09/2021</a:t>
             </a:fld>
             <a:endParaRPr lang="en-GB"/>
           </a:p>
@@ -475,7 +475,7 @@
           <a:p>
             <a:fld id="{4C324CBA-B5F8-49E4-A74D-FDDDFCEF0F4B}" type="datetimeFigureOut">
               <a:rPr lang="en-GB" smtClean="0"/>
-              <a:t>28/08/2021</a:t>
+              <a:t>02/09/2021</a:t>
             </a:fld>
             <a:endParaRPr lang="en-GB"/>
           </a:p>
@@ -685,7 +685,7 @@
           <a:p>
             <a:fld id="{4C324CBA-B5F8-49E4-A74D-FDDDFCEF0F4B}" type="datetimeFigureOut">
               <a:rPr lang="en-GB" smtClean="0"/>
-              <a:t>28/08/2021</a:t>
+              <a:t>02/09/2021</a:t>
             </a:fld>
             <a:endParaRPr lang="en-GB"/>
           </a:p>
@@ -885,7 +885,7 @@
           <a:p>
             <a:fld id="{4C324CBA-B5F8-49E4-A74D-FDDDFCEF0F4B}" type="datetimeFigureOut">
               <a:rPr lang="en-GB" smtClean="0"/>
-              <a:t>28/08/2021</a:t>
+              <a:t>02/09/2021</a:t>
             </a:fld>
             <a:endParaRPr lang="en-GB"/>
           </a:p>
@@ -1161,7 +1161,7 @@
           <a:p>
             <a:fld id="{4C324CBA-B5F8-49E4-A74D-FDDDFCEF0F4B}" type="datetimeFigureOut">
               <a:rPr lang="en-GB" smtClean="0"/>
-              <a:t>28/08/2021</a:t>
+              <a:t>02/09/2021</a:t>
             </a:fld>
             <a:endParaRPr lang="en-GB"/>
           </a:p>
@@ -1429,7 +1429,7 @@
           <a:p>
             <a:fld id="{4C324CBA-B5F8-49E4-A74D-FDDDFCEF0F4B}" type="datetimeFigureOut">
               <a:rPr lang="en-GB" smtClean="0"/>
-              <a:t>28/08/2021</a:t>
+              <a:t>02/09/2021</a:t>
             </a:fld>
             <a:endParaRPr lang="en-GB"/>
           </a:p>
@@ -1844,7 +1844,7 @@
           <a:p>
             <a:fld id="{4C324CBA-B5F8-49E4-A74D-FDDDFCEF0F4B}" type="datetimeFigureOut">
               <a:rPr lang="en-GB" smtClean="0"/>
-              <a:t>28/08/2021</a:t>
+              <a:t>02/09/2021</a:t>
             </a:fld>
             <a:endParaRPr lang="en-GB"/>
           </a:p>
@@ -1986,7 +1986,7 @@
           <a:p>
             <a:fld id="{4C324CBA-B5F8-49E4-A74D-FDDDFCEF0F4B}" type="datetimeFigureOut">
               <a:rPr lang="en-GB" smtClean="0"/>
-              <a:t>28/08/2021</a:t>
+              <a:t>02/09/2021</a:t>
             </a:fld>
             <a:endParaRPr lang="en-GB"/>
           </a:p>
@@ -2099,7 +2099,7 @@
           <a:p>
             <a:fld id="{4C324CBA-B5F8-49E4-A74D-FDDDFCEF0F4B}" type="datetimeFigureOut">
               <a:rPr lang="en-GB" smtClean="0"/>
-              <a:t>28/08/2021</a:t>
+              <a:t>02/09/2021</a:t>
             </a:fld>
             <a:endParaRPr lang="en-GB"/>
           </a:p>
@@ -2412,7 +2412,7 @@
           <a:p>
             <a:fld id="{4C324CBA-B5F8-49E4-A74D-FDDDFCEF0F4B}" type="datetimeFigureOut">
               <a:rPr lang="en-GB" smtClean="0"/>
-              <a:t>28/08/2021</a:t>
+              <a:t>02/09/2021</a:t>
             </a:fld>
             <a:endParaRPr lang="en-GB"/>
           </a:p>
@@ -2701,7 +2701,7 @@
           <a:p>
             <a:fld id="{4C324CBA-B5F8-49E4-A74D-FDDDFCEF0F4B}" type="datetimeFigureOut">
               <a:rPr lang="en-GB" smtClean="0"/>
-              <a:t>28/08/2021</a:t>
+              <a:t>02/09/2021</a:t>
             </a:fld>
             <a:endParaRPr lang="en-GB"/>
           </a:p>
@@ -2946,7 +2946,7 @@
             <a:fld id="{4C324CBA-B5F8-49E4-A74D-FDDDFCEF0F4B}" type="datetimeFigureOut">
               <a:rPr lang="en-GB" smtClean="0"/>
               <a:pPr/>
-              <a:t>28/08/2021</a:t>
+              <a:t>02/09/2021</a:t>
             </a:fld>
             <a:endParaRPr lang="en-GB" dirty="0"/>
           </a:p>
@@ -3633,7 +3633,7 @@
               <a:rPr lang="en-GB" sz="3600" dirty="0">
                 <a:latin typeface="APL385 Unicode" panose="020B0709000202000203" pitchFamily="49" charset="0"/>
               </a:rPr>
-              <a:t>18 20 15</a:t>
+              <a:t>14 12 11</a:t>
             </a:r>
           </a:p>
           <a:p>
@@ -3695,7 +3695,7 @@
               <a:rPr lang="en-GB" sz="3600" dirty="0">
                 <a:latin typeface="APL385 Unicode" panose="020B0709000202000203" pitchFamily="49" charset="0"/>
               </a:rPr>
-              <a:t>20</a:t>
+              <a:t>14</a:t>
             </a:r>
             <a:endParaRPr lang="en-GB" sz="3600" dirty="0">
               <a:latin typeface="Atkinson Hyperlegible" pitchFamily="50" charset="0"/>
@@ -3748,7 +3748,7 @@
         <p:spPr>
           <a:xfrm>
             <a:off x="696000" y="870687"/>
-            <a:ext cx="10800000" cy="5078313"/>
+            <a:ext cx="10800000" cy="4524315"/>
           </a:xfrm>
           <a:prstGeom prst="rect">
             <a:avLst/>
@@ -3788,7 +3788,7 @@
               <a:rPr lang="en-GB" sz="3600" dirty="0">
                 <a:latin typeface="Atkinson Hyperlegible" pitchFamily="50" charset="0"/>
               </a:rPr>
-              <a:t>For each day, how many products did sold at least 1?</a:t>
+              <a:t>For each day, how many products sold at least 1?</a:t>
             </a:r>
           </a:p>
           <a:p>
@@ -3829,7 +3829,7 @@
               <a:rPr lang="en-GB" sz="3600" dirty="0">
                 <a:latin typeface="Atkinson Hyperlegible" pitchFamily="50" charset="0"/>
               </a:rPr>
-              <a:t>On how many days did we sell more than 10 items in total?</a:t>
+              <a:t>On which days were 10 or more items sold?</a:t>
             </a:r>
           </a:p>
           <a:p>
@@ -3860,11 +3860,8 @@
               <a:rPr lang="en-GB" sz="3600" dirty="0">
                 <a:latin typeface="APL385 Unicode" panose="020B0709000202000203" pitchFamily="49" charset="0"/>
               </a:rPr>
-              <a:t>2</a:t>
-            </a:r>
-            <a:endParaRPr lang="en-GB" sz="3600" dirty="0">
-              <a:latin typeface="Atkinson Hyperlegible" pitchFamily="50" charset="0"/>
-            </a:endParaRPr>
+              <a:t>0 1 1 0 0</a:t>
+            </a:r>
           </a:p>
         </p:txBody>
       </p:sp>
@@ -3999,7 +3996,7 @@
               <a:rPr lang="en-GB" sz="3600" dirty="0">
                 <a:latin typeface="APL385 Unicode" panose="020B0709000202000203" pitchFamily="49" charset="0"/>
               </a:rPr>
-              <a:t>10.5 39.95  0   </a:t>
+              <a:t>10.5  7.99  0   </a:t>
             </a:r>
           </a:p>
           <a:p>
@@ -4010,7 +4007,7 @@
               <a:rPr lang="en-GB" sz="3600" dirty="0">
                 <a:latin typeface="APL385 Unicode" panose="020B0709000202000203" pitchFamily="49" charset="0"/>
               </a:rPr>
-              <a:t>24.5 23.97 21.25</a:t>
+              <a:t>24.5 23.97  4.25</a:t>
             </a:r>
           </a:p>
           <a:p>
@@ -4032,7 +4029,7 @@
               <a:rPr lang="en-GB" sz="3600" dirty="0">
                 <a:latin typeface="APL385 Unicode" panose="020B0709000202000203" pitchFamily="49" charset="0"/>
               </a:rPr>
-              <a:t>17.5  0    29.75</a:t>
+              <a:t> 3.5  0    29.75</a:t>
             </a:r>
           </a:p>
           <a:p>
@@ -4043,7 +4040,7 @@
               <a:rPr lang="en-GB" sz="3600" dirty="0">
                 <a:latin typeface="APL385 Unicode" panose="020B0709000202000203" pitchFamily="49" charset="0"/>
               </a:rPr>
-              <a:t>10.5 39.95  0   </a:t>
+              <a:t>10.5  7.99  0 </a:t>
             </a:r>
           </a:p>
         </p:txBody>
@@ -6584,7 +6581,7 @@
               <a:rPr lang="en-GB" sz="3600" dirty="0">
                 <a:latin typeface="APL385 Unicode" panose="020B0709000202000203" pitchFamily="49" charset="0"/>
               </a:rPr>
-              <a:t>      quantities ← 5 3⍴3 5 0 7</a:t>
+              <a:t>      quantities ← 5 3⍴3 1 0 7</a:t>
             </a:r>
             <a:endParaRPr lang="en-GB" sz="3600" dirty="0">
               <a:latin typeface="Atkinson Hyperlegible" pitchFamily="50" charset="0"/>
@@ -6720,7 +6717,7 @@
               <a:rPr lang="en-GB" sz="3600" dirty="0">
                 <a:latin typeface="APL385 Unicode" panose="020B0709000202000203" pitchFamily="49" charset="0"/>
               </a:rPr>
-              <a:t>8 15 10 12 8</a:t>
+              <a:t>4 11 10 8 4</a:t>
             </a:r>
           </a:p>
           <a:p>
@@ -6782,7 +6779,7 @@
               <a:rPr lang="en-GB" sz="3600" dirty="0">
                 <a:latin typeface="APL385 Unicode" panose="020B0709000202000203" pitchFamily="49" charset="0"/>
               </a:rPr>
-              <a:t>53</a:t>
+              <a:t>37</a:t>
             </a:r>
             <a:endParaRPr lang="en-GB" sz="3600" dirty="0">
               <a:latin typeface="Atkinson Hyperlegible" pitchFamily="50" charset="0"/>

</xml_diff>